<commit_message>
2nd presentation about final theis
using nvidia GPU to run the codes
</commit_message>
<xml_diff>
--- a/presentation/GreenAI_2nd.pptx
+++ b/presentation/GreenAI_2nd.pptx
@@ -6,10 +6,10 @@
     <p:sldMasterId id="2147483672" r:id="rId2"/>
   </p:sldMasterIdLst>
   <p:notesMasterIdLst>
-    <p:notesMasterId r:id="rId10"/>
+    <p:notesMasterId r:id="rId11"/>
   </p:notesMasterIdLst>
   <p:handoutMasterIdLst>
-    <p:handoutMasterId r:id="rId11"/>
+    <p:handoutMasterId r:id="rId12"/>
   </p:handoutMasterIdLst>
   <p:sldIdLst>
     <p:sldId id="256" r:id="rId3"/>
@@ -18,7 +18,8 @@
     <p:sldId id="371" r:id="rId6"/>
     <p:sldId id="353" r:id="rId7"/>
     <p:sldId id="372" r:id="rId8"/>
-    <p:sldId id="261" r:id="rId9"/>
+    <p:sldId id="373" r:id="rId9"/>
+    <p:sldId id="261" r:id="rId10"/>
   </p:sldIdLst>
   <p:sldSz cx="12192000" cy="6858000"/>
   <p:notesSz cx="6858000" cy="9144000"/>
@@ -11373,6 +11374,97 @@
     <p:extLst>
       <p:ext uri="{BB962C8B-B14F-4D97-AF65-F5344CB8AC3E}">
         <p14:creationId xmlns:p14="http://schemas.microsoft.com/office/powerpoint/2010/main" val="3024911487"/>
+      </p:ext>
+    </p:extLst>
+  </p:cSld>
+  <p:clrMapOvr>
+    <a:masterClrMapping/>
+  </p:clrMapOvr>
+</p:notes>
+</file>
+
+<file path=ppt/notesSlides/notesSlide7.xml><?xml version="1.0" encoding="utf-8"?>
+<p:notes xmlns:a="http://schemas.openxmlformats.org/drawingml/2006/main" xmlns:r="http://schemas.openxmlformats.org/officeDocument/2006/relationships" xmlns:p="http://schemas.openxmlformats.org/presentationml/2006/main">
+  <p:cSld>
+    <p:spTree>
+      <p:nvGrpSpPr>
+        <p:cNvPr id="1" name=""/>
+        <p:cNvGrpSpPr/>
+        <p:nvPr/>
+      </p:nvGrpSpPr>
+      <p:grpSpPr>
+        <a:xfrm>
+          <a:off x="0" y="0"/>
+          <a:ext cx="0" cy="0"/>
+          <a:chOff x="0" y="0"/>
+          <a:chExt cx="0" cy="0"/>
+        </a:xfrm>
+      </p:grpSpPr>
+      <p:sp>
+        <p:nvSpPr>
+          <p:cNvPr id="2" name="幻灯片图像占位符 1"/>
+          <p:cNvSpPr>
+            <a:spLocks noGrp="1" noRot="1" noChangeAspect="1"/>
+          </p:cNvSpPr>
+          <p:nvPr>
+            <p:ph type="sldImg"/>
+          </p:nvPr>
+        </p:nvSpPr>
+        <p:spPr/>
+      </p:sp>
+      <p:sp>
+        <p:nvSpPr>
+          <p:cNvPr id="3" name="备注占位符 2"/>
+          <p:cNvSpPr>
+            <a:spLocks noGrp="1"/>
+          </p:cNvSpPr>
+          <p:nvPr>
+            <p:ph type="body" idx="1"/>
+          </p:nvPr>
+        </p:nvSpPr>
+        <p:spPr/>
+        <p:txBody>
+          <a:bodyPr/>
+          <a:lstStyle/>
+          <a:p>
+            <a:pPr marL="342900" lvl="0" indent="-342900" algn="just">
+              <a:buFont typeface="宋体" panose="02010600030101010101" pitchFamily="2" charset="-122"/>
+              <a:buChar char="•"/>
+              <a:tabLst>
+                <a:tab pos="457200" algn="l"/>
+              </a:tabLst>
+            </a:pPr>
+            <a:endParaRPr kumimoji="1" lang="zh-CN" altLang="en-US" dirty="0"/>
+          </a:p>
+        </p:txBody>
+      </p:sp>
+      <p:sp>
+        <p:nvSpPr>
+          <p:cNvPr id="4" name="灯片编号占位符 3"/>
+          <p:cNvSpPr>
+            <a:spLocks noGrp="1"/>
+          </p:cNvSpPr>
+          <p:nvPr>
+            <p:ph type="sldNum" sz="quarter" idx="5"/>
+          </p:nvPr>
+        </p:nvSpPr>
+        <p:spPr/>
+        <p:txBody>
+          <a:bodyPr/>
+          <a:lstStyle/>
+          <a:p>
+            <a:fld id="{E9E6FDB6-6D2B-46C1-9FA1-D82906A37C3A}" type="slidenum">
+              <a:rPr lang="zh-CN" altLang="en-US" smtClean="0"/>
+              <a:t>7</a:t>
+            </a:fld>
+            <a:endParaRPr lang="zh-CN" altLang="en-US"/>
+          </a:p>
+        </p:txBody>
+      </p:sp>
+    </p:spTree>
+    <p:extLst>
+      <p:ext uri="{BB962C8B-B14F-4D97-AF65-F5344CB8AC3E}">
+        <p14:creationId xmlns:p14="http://schemas.microsoft.com/office/powerpoint/2010/main" val="705917428"/>
       </p:ext>
     </p:extLst>
   </p:cSld>
@@ -18388,8 +18480,8 @@
         </p:blipFill>
         <p:spPr>
           <a:xfrm>
-            <a:off x="669924" y="3968611"/>
-            <a:ext cx="4903662" cy="2472094"/>
+            <a:off x="577019" y="3866858"/>
+            <a:ext cx="5089472" cy="2565767"/>
           </a:xfrm>
           <a:prstGeom prst="rect">
             <a:avLst/>
@@ -18966,6 +19058,42 @@
           </a:p>
         </p:txBody>
       </p:sp>
+      <p:sp>
+        <p:nvSpPr>
+          <p:cNvPr id="3" name="文本框 2">
+            <a:extLst>
+              <a:ext uri="{FF2B5EF4-FFF2-40B4-BE49-F238E27FC236}">
+                <a16:creationId xmlns:a16="http://schemas.microsoft.com/office/drawing/2014/main" id="{B9A5C9CF-048B-FA43-2694-8C30FA57ABE2}"/>
+              </a:ext>
+            </a:extLst>
+          </p:cNvPr>
+          <p:cNvSpPr txBox="1"/>
+          <p:nvPr/>
+        </p:nvSpPr>
+        <p:spPr>
+          <a:xfrm>
+            <a:off x="8112642" y="2224067"/>
+            <a:ext cx="3044423" cy="369332"/>
+          </a:xfrm>
+          <a:prstGeom prst="rect">
+            <a:avLst/>
+          </a:prstGeom>
+          <a:noFill/>
+        </p:spPr>
+        <p:txBody>
+          <a:bodyPr wrap="none" rtlCol="0">
+            <a:spAutoFit/>
+          </a:bodyPr>
+          <a:lstStyle/>
+          <a:p>
+            <a:r>
+              <a:rPr kumimoji="1" lang="en-US" altLang="zh-CN" dirty="0"/>
+              <a:t>Mean energy: 3932J/epoch </a:t>
+            </a:r>
+            <a:endParaRPr kumimoji="1" lang="zh-CN" altLang="en-US" dirty="0"/>
+          </a:p>
+        </p:txBody>
+      </p:sp>
     </p:spTree>
     <p:extLst>
       <p:ext uri="{BB962C8B-B14F-4D97-AF65-F5344CB8AC3E}">
@@ -19189,6 +19317,42 @@
           </a:prstGeom>
         </p:spPr>
       </p:pic>
+      <p:sp>
+        <p:nvSpPr>
+          <p:cNvPr id="8" name="文本框 7">
+            <a:extLst>
+              <a:ext uri="{FF2B5EF4-FFF2-40B4-BE49-F238E27FC236}">
+                <a16:creationId xmlns:a16="http://schemas.microsoft.com/office/drawing/2014/main" id="{149A9474-5BD4-0E27-6254-CBC153C2F682}"/>
+              </a:ext>
+            </a:extLst>
+          </p:cNvPr>
+          <p:cNvSpPr txBox="1"/>
+          <p:nvPr/>
+        </p:nvSpPr>
+        <p:spPr>
+          <a:xfrm>
+            <a:off x="6673408" y="5009798"/>
+            <a:ext cx="3044423" cy="369332"/>
+          </a:xfrm>
+          <a:prstGeom prst="rect">
+            <a:avLst/>
+          </a:prstGeom>
+          <a:noFill/>
+        </p:spPr>
+        <p:txBody>
+          <a:bodyPr wrap="none" rtlCol="0">
+            <a:spAutoFit/>
+          </a:bodyPr>
+          <a:lstStyle/>
+          <a:p>
+            <a:r>
+              <a:rPr kumimoji="1" lang="en-US" altLang="zh-CN" dirty="0"/>
+              <a:t>Mean energy: 4192J/epoch </a:t>
+            </a:r>
+            <a:endParaRPr kumimoji="1" lang="zh-CN" altLang="en-US" dirty="0"/>
+          </a:p>
+        </p:txBody>
+      </p:sp>
     </p:spTree>
     <p:extLst>
       <p:ext uri="{BB962C8B-B14F-4D97-AF65-F5344CB8AC3E}">
@@ -19206,6 +19370,151 @@
 </file>
 
 <file path=ppt/slides/slide7.xml><?xml version="1.0" encoding="utf-8"?>
+<p:sld xmlns:a="http://schemas.openxmlformats.org/drawingml/2006/main" xmlns:r="http://schemas.openxmlformats.org/officeDocument/2006/relationships" xmlns:p="http://schemas.openxmlformats.org/presentationml/2006/main">
+  <p:cSld>
+    <p:spTree>
+      <p:nvGrpSpPr>
+        <p:cNvPr id="1" name=""/>
+        <p:cNvGrpSpPr/>
+        <p:nvPr/>
+      </p:nvGrpSpPr>
+      <p:grpSpPr>
+        <a:xfrm>
+          <a:off x="0" y="0"/>
+          <a:ext cx="0" cy="0"/>
+          <a:chOff x="0" y="0"/>
+          <a:chExt cx="0" cy="0"/>
+        </a:xfrm>
+      </p:grpSpPr>
+      <p:sp>
+        <p:nvSpPr>
+          <p:cNvPr id="2" name="标题 1"/>
+          <p:cNvSpPr>
+            <a:spLocks noGrp="1"/>
+          </p:cNvSpPr>
+          <p:nvPr>
+            <p:ph type="title"/>
+          </p:nvPr>
+        </p:nvSpPr>
+        <p:spPr>
+          <a:xfrm>
+            <a:off x="669924" y="-8794"/>
+            <a:ext cx="10850563" cy="1028699"/>
+          </a:xfrm>
+        </p:spPr>
+        <p:txBody>
+          <a:bodyPr/>
+          <a:lstStyle/>
+          <a:p>
+            <a:r>
+              <a:rPr lang="en-US" altLang="zh-CN" sz="2800" b="1" dirty="0">
+                <a:solidFill>
+                  <a:schemeClr val="tx1"/>
+                </a:solidFill>
+              </a:rPr>
+              <a:t>Question</a:t>
+            </a:r>
+            <a:endParaRPr lang="en-US" altLang="zh-CN" dirty="0"/>
+          </a:p>
+        </p:txBody>
+      </p:sp>
+      <p:pic>
+        <p:nvPicPr>
+          <p:cNvPr id="4" name="Google Shape;64;p1" descr="徽标&#10;&#10;描述已自动生成">
+            <a:extLst>
+              <a:ext uri="{FF2B5EF4-FFF2-40B4-BE49-F238E27FC236}">
+                <a16:creationId xmlns:a16="http://schemas.microsoft.com/office/drawing/2014/main" id="{B926DC82-46B1-7389-7F3F-3D47478E3623}"/>
+              </a:ext>
+            </a:extLst>
+          </p:cNvPr>
+          <p:cNvPicPr preferRelativeResize="0"/>
+          <p:nvPr/>
+        </p:nvPicPr>
+        <p:blipFill rotWithShape="1">
+          <a:blip r:embed="rId3">
+            <a:alphaModFix/>
+          </a:blip>
+          <a:srcRect/>
+          <a:stretch/>
+        </p:blipFill>
+        <p:spPr>
+          <a:xfrm>
+            <a:off x="9863328" y="1"/>
+            <a:ext cx="2328672" cy="1028700"/>
+          </a:xfrm>
+          <a:prstGeom prst="rect">
+            <a:avLst/>
+          </a:prstGeom>
+          <a:noFill/>
+          <a:ln>
+            <a:noFill/>
+          </a:ln>
+        </p:spPr>
+      </p:pic>
+      <p:sp>
+        <p:nvSpPr>
+          <p:cNvPr id="7" name="文本框 6">
+            <a:extLst>
+              <a:ext uri="{FF2B5EF4-FFF2-40B4-BE49-F238E27FC236}">
+                <a16:creationId xmlns:a16="http://schemas.microsoft.com/office/drawing/2014/main" id="{2E1223A1-9F22-73A4-8242-2D9E36A747B5}"/>
+              </a:ext>
+            </a:extLst>
+          </p:cNvPr>
+          <p:cNvSpPr txBox="1"/>
+          <p:nvPr/>
+        </p:nvSpPr>
+        <p:spPr>
+          <a:xfrm>
+            <a:off x="903767" y="1254642"/>
+            <a:ext cx="7276351" cy="646331"/>
+          </a:xfrm>
+          <a:prstGeom prst="rect">
+            <a:avLst/>
+          </a:prstGeom>
+          <a:noFill/>
+        </p:spPr>
+        <p:txBody>
+          <a:bodyPr wrap="none" rtlCol="0">
+            <a:spAutoFit/>
+          </a:bodyPr>
+          <a:lstStyle/>
+          <a:p>
+            <a:pPr marL="342900" indent="-342900">
+              <a:buAutoNum type="arabicPeriod"/>
+            </a:pPr>
+            <a:r>
+              <a:rPr kumimoji="1" lang="en-US" altLang="zh-CN" dirty="0"/>
+              <a:t>How to make compromise between acc and energy consumption?</a:t>
+            </a:r>
+          </a:p>
+          <a:p>
+            <a:pPr marL="342900" indent="-342900">
+              <a:buAutoNum type="arabicPeriod"/>
+            </a:pPr>
+            <a:r>
+              <a:rPr kumimoji="1" lang="en-US" altLang="zh-CN" dirty="0"/>
+              <a:t>Is time sufficient to be the measurement?</a:t>
+            </a:r>
+          </a:p>
+        </p:txBody>
+      </p:sp>
+    </p:spTree>
+    <p:extLst>
+      <p:ext uri="{BB962C8B-B14F-4D97-AF65-F5344CB8AC3E}">
+        <p14:creationId xmlns:p14="http://schemas.microsoft.com/office/powerpoint/2010/main" val="2296736367"/>
+      </p:ext>
+    </p:extLst>
+  </p:cSld>
+  <p:clrMapOvr>
+    <a:masterClrMapping/>
+  </p:clrMapOvr>
+  <p:transition>
+    <p:checker/>
+  </p:transition>
+</p:sld>
+</file>
+
+<file path=ppt/slides/slide8.xml><?xml version="1.0" encoding="utf-8"?>
 <p:sld xmlns:a="http://schemas.openxmlformats.org/drawingml/2006/main" xmlns:r="http://schemas.openxmlformats.org/officeDocument/2006/relationships" xmlns:p="http://schemas.openxmlformats.org/presentationml/2006/main">
   <p:cSld>
     <p:spTree>

</xml_diff>